<commit_message>
Ch05: part of the pictures
</commit_message>
<xml_diff>
--- a/04 - Cr MagOpt/Picture/PLEClose.pptx
+++ b/04 - Cr MagOpt/Picture/PLEClose.pptx
@@ -7,7 +7,7 @@
   <p:sldIdLst>
     <p:sldId id="256" r:id="rId3"/>
   </p:sldIdLst>
-  <p:sldSz cx="7021512" cy="6480175"/>
+  <p:sldSz cx="7740650" cy="6480175"/>
   <p:notesSz cx="7559675" cy="10691812"/>
 </p:presentation>
 </file>
@@ -63,8 +63,8 @@
         </p:nvSpPr>
         <p:spPr>
           <a:xfrm>
-            <a:off x="526680" y="2013120"/>
-            <a:ext cx="5968080" cy="1388880"/>
+            <a:off x="580680" y="2013120"/>
+            <a:ext cx="6579360" cy="1388880"/>
           </a:xfrm>
           <a:prstGeom prst="rect">
             <a:avLst/>
@@ -89,8 +89,8 @@
         </p:nvSpPr>
         <p:spPr>
           <a:xfrm>
-            <a:off x="351000" y="1516320"/>
-            <a:ext cx="6318720" cy="1792440"/>
+            <a:off x="387000" y="1516320"/>
+            <a:ext cx="6966000" cy="1792440"/>
           </a:xfrm>
           <a:prstGeom prst="rect">
             <a:avLst/>
@@ -115,8 +115,8 @@
         </p:nvSpPr>
         <p:spPr>
           <a:xfrm>
-            <a:off x="351000" y="3479400"/>
-            <a:ext cx="6318720" cy="1792440"/>
+            <a:off x="387000" y="3479400"/>
+            <a:ext cx="6966000" cy="1792440"/>
           </a:xfrm>
           <a:prstGeom prst="rect">
             <a:avLst/>
@@ -163,8 +163,8 @@
         </p:nvSpPr>
         <p:spPr>
           <a:xfrm>
-            <a:off x="526680" y="2013120"/>
-            <a:ext cx="5968080" cy="1388880"/>
+            <a:off x="580680" y="2013120"/>
+            <a:ext cx="6579360" cy="1388880"/>
           </a:xfrm>
           <a:prstGeom prst="rect">
             <a:avLst/>
@@ -189,8 +189,8 @@
         </p:nvSpPr>
         <p:spPr>
           <a:xfrm>
-            <a:off x="351000" y="1516320"/>
-            <a:ext cx="3083400" cy="1792440"/>
+            <a:off x="387000" y="1516320"/>
+            <a:ext cx="3399120" cy="1792440"/>
           </a:xfrm>
           <a:prstGeom prst="rect">
             <a:avLst/>
@@ -215,8 +215,8 @@
         </p:nvSpPr>
         <p:spPr>
           <a:xfrm>
-            <a:off x="3588840" y="1516320"/>
-            <a:ext cx="3083400" cy="1792440"/>
+            <a:off x="3956400" y="1516320"/>
+            <a:ext cx="3399120" cy="1792440"/>
           </a:xfrm>
           <a:prstGeom prst="rect">
             <a:avLst/>
@@ -241,8 +241,8 @@
         </p:nvSpPr>
         <p:spPr>
           <a:xfrm>
-            <a:off x="3588840" y="3479400"/>
-            <a:ext cx="3083400" cy="1792440"/>
+            <a:off x="3956400" y="3479400"/>
+            <a:ext cx="3399120" cy="1792440"/>
           </a:xfrm>
           <a:prstGeom prst="rect">
             <a:avLst/>
@@ -267,8 +267,8 @@
         </p:nvSpPr>
         <p:spPr>
           <a:xfrm>
-            <a:off x="351000" y="3479400"/>
-            <a:ext cx="3083400" cy="1792440"/>
+            <a:off x="387000" y="3479400"/>
+            <a:ext cx="3399120" cy="1792440"/>
           </a:xfrm>
           <a:prstGeom prst="rect">
             <a:avLst/>
@@ -315,8 +315,8 @@
         </p:nvSpPr>
         <p:spPr>
           <a:xfrm>
-            <a:off x="526680" y="2013120"/>
-            <a:ext cx="5968080" cy="1388880"/>
+            <a:off x="580680" y="2013120"/>
+            <a:ext cx="6579360" cy="1388880"/>
           </a:xfrm>
           <a:prstGeom prst="rect">
             <a:avLst/>
@@ -341,8 +341,8 @@
         </p:nvSpPr>
         <p:spPr>
           <a:xfrm>
-            <a:off x="351000" y="1516320"/>
-            <a:ext cx="6318720" cy="3758040"/>
+            <a:off x="387000" y="1516320"/>
+            <a:ext cx="6966000" cy="3758040"/>
           </a:xfrm>
           <a:prstGeom prst="rect">
             <a:avLst/>
@@ -367,8 +367,8 @@
         </p:nvSpPr>
         <p:spPr>
           <a:xfrm>
-            <a:off x="351000" y="1516320"/>
-            <a:ext cx="6318720" cy="3758040"/>
+            <a:off x="387000" y="1516320"/>
+            <a:ext cx="6966000" cy="3758040"/>
           </a:xfrm>
           <a:prstGeom prst="rect">
             <a:avLst/>
@@ -395,7 +395,7 @@
         </p:blipFill>
         <p:spPr>
           <a:xfrm>
-            <a:off x="1155240" y="1515960"/>
+            <a:off x="1514880" y="1515960"/>
             <a:ext cx="4709880" cy="3758040"/>
           </a:xfrm>
           <a:prstGeom prst="rect">
@@ -420,7 +420,7 @@
         </p:blipFill>
         <p:spPr>
           <a:xfrm>
-            <a:off x="1155240" y="1515960"/>
+            <a:off x="1514880" y="1515960"/>
             <a:ext cx="4709880" cy="3758040"/>
           </a:xfrm>
           <a:prstGeom prst="rect">
@@ -465,8 +465,8 @@
         </p:nvSpPr>
         <p:spPr>
           <a:xfrm>
-            <a:off x="526680" y="2013120"/>
-            <a:ext cx="5968080" cy="1388880"/>
+            <a:off x="580680" y="2013120"/>
+            <a:ext cx="6579360" cy="1388880"/>
           </a:xfrm>
           <a:prstGeom prst="rect">
             <a:avLst/>
@@ -491,8 +491,8 @@
         </p:nvSpPr>
         <p:spPr>
           <a:xfrm>
-            <a:off x="351000" y="1516320"/>
-            <a:ext cx="6318720" cy="3758400"/>
+            <a:off x="387000" y="1516320"/>
+            <a:ext cx="6966000" cy="3758400"/>
           </a:xfrm>
           <a:prstGeom prst="rect">
             <a:avLst/>
@@ -540,8 +540,8 @@
         </p:nvSpPr>
         <p:spPr>
           <a:xfrm>
-            <a:off x="526680" y="2013120"/>
-            <a:ext cx="5968080" cy="1388880"/>
+            <a:off x="580680" y="2013120"/>
+            <a:ext cx="6579360" cy="1388880"/>
           </a:xfrm>
           <a:prstGeom prst="rect">
             <a:avLst/>
@@ -566,8 +566,8 @@
         </p:nvSpPr>
         <p:spPr>
           <a:xfrm>
-            <a:off x="351000" y="1516320"/>
-            <a:ext cx="6318720" cy="3758040"/>
+            <a:off x="387000" y="1516320"/>
+            <a:ext cx="6966000" cy="3758040"/>
           </a:xfrm>
           <a:prstGeom prst="rect">
             <a:avLst/>
@@ -614,8 +614,8 @@
         </p:nvSpPr>
         <p:spPr>
           <a:xfrm>
-            <a:off x="526680" y="2013120"/>
-            <a:ext cx="5968080" cy="1388880"/>
+            <a:off x="580680" y="2013120"/>
+            <a:ext cx="6579360" cy="1388880"/>
           </a:xfrm>
           <a:prstGeom prst="rect">
             <a:avLst/>
@@ -640,8 +640,8 @@
         </p:nvSpPr>
         <p:spPr>
           <a:xfrm>
-            <a:off x="351000" y="1516320"/>
-            <a:ext cx="3083400" cy="3758040"/>
+            <a:off x="387000" y="1516320"/>
+            <a:ext cx="3399120" cy="3758040"/>
           </a:xfrm>
           <a:prstGeom prst="rect">
             <a:avLst/>
@@ -666,8 +666,8 @@
         </p:nvSpPr>
         <p:spPr>
           <a:xfrm>
-            <a:off x="3588840" y="1516320"/>
-            <a:ext cx="3083400" cy="3758040"/>
+            <a:off x="3956400" y="1516320"/>
+            <a:ext cx="3399120" cy="3758040"/>
           </a:xfrm>
           <a:prstGeom prst="rect">
             <a:avLst/>
@@ -714,8 +714,8 @@
         </p:nvSpPr>
         <p:spPr>
           <a:xfrm>
-            <a:off x="526680" y="2013120"/>
-            <a:ext cx="5968080" cy="1388880"/>
+            <a:off x="580680" y="2013120"/>
+            <a:ext cx="6579360" cy="1388880"/>
           </a:xfrm>
           <a:prstGeom prst="rect">
             <a:avLst/>
@@ -762,8 +762,8 @@
         </p:nvSpPr>
         <p:spPr>
           <a:xfrm>
-            <a:off x="526680" y="2013120"/>
-            <a:ext cx="5968080" cy="6437880"/>
+            <a:off x="580680" y="2013120"/>
+            <a:ext cx="6579360" cy="6437880"/>
           </a:xfrm>
           <a:prstGeom prst="rect">
             <a:avLst/>
@@ -811,8 +811,8 @@
         </p:nvSpPr>
         <p:spPr>
           <a:xfrm>
-            <a:off x="526680" y="2013120"/>
-            <a:ext cx="5968080" cy="1388880"/>
+            <a:off x="580680" y="2013120"/>
+            <a:ext cx="6579360" cy="1388880"/>
           </a:xfrm>
           <a:prstGeom prst="rect">
             <a:avLst/>
@@ -837,8 +837,8 @@
         </p:nvSpPr>
         <p:spPr>
           <a:xfrm>
-            <a:off x="351000" y="1516320"/>
-            <a:ext cx="3083400" cy="1792440"/>
+            <a:off x="387000" y="1516320"/>
+            <a:ext cx="3399120" cy="1792440"/>
           </a:xfrm>
           <a:prstGeom prst="rect">
             <a:avLst/>
@@ -863,8 +863,8 @@
         </p:nvSpPr>
         <p:spPr>
           <a:xfrm>
-            <a:off x="351000" y="3479400"/>
-            <a:ext cx="3083400" cy="1792440"/>
+            <a:off x="387000" y="3479400"/>
+            <a:ext cx="3399120" cy="1792440"/>
           </a:xfrm>
           <a:prstGeom prst="rect">
             <a:avLst/>
@@ -889,8 +889,8 @@
         </p:nvSpPr>
         <p:spPr>
           <a:xfrm>
-            <a:off x="3588840" y="1516320"/>
-            <a:ext cx="3083400" cy="3758040"/>
+            <a:off x="3956400" y="1516320"/>
+            <a:ext cx="3399120" cy="3758040"/>
           </a:xfrm>
           <a:prstGeom prst="rect">
             <a:avLst/>
@@ -937,8 +937,8 @@
         </p:nvSpPr>
         <p:spPr>
           <a:xfrm>
-            <a:off x="526680" y="2013120"/>
-            <a:ext cx="5968080" cy="1388880"/>
+            <a:off x="580680" y="2013120"/>
+            <a:ext cx="6579360" cy="1388880"/>
           </a:xfrm>
           <a:prstGeom prst="rect">
             <a:avLst/>
@@ -963,8 +963,8 @@
         </p:nvSpPr>
         <p:spPr>
           <a:xfrm>
-            <a:off x="351000" y="1516320"/>
-            <a:ext cx="3083400" cy="3758040"/>
+            <a:off x="387000" y="1516320"/>
+            <a:ext cx="3399120" cy="3758040"/>
           </a:xfrm>
           <a:prstGeom prst="rect">
             <a:avLst/>
@@ -989,8 +989,8 @@
         </p:nvSpPr>
         <p:spPr>
           <a:xfrm>
-            <a:off x="3588840" y="1516320"/>
-            <a:ext cx="3083400" cy="1792440"/>
+            <a:off x="3956400" y="1516320"/>
+            <a:ext cx="3399120" cy="1792440"/>
           </a:xfrm>
           <a:prstGeom prst="rect">
             <a:avLst/>
@@ -1015,8 +1015,8 @@
         </p:nvSpPr>
         <p:spPr>
           <a:xfrm>
-            <a:off x="3588840" y="3479400"/>
-            <a:ext cx="3083400" cy="1792440"/>
+            <a:off x="3956400" y="3479400"/>
+            <a:ext cx="3399120" cy="1792440"/>
           </a:xfrm>
           <a:prstGeom prst="rect">
             <a:avLst/>
@@ -1063,8 +1063,8 @@
         </p:nvSpPr>
         <p:spPr>
           <a:xfrm>
-            <a:off x="526680" y="2013120"/>
-            <a:ext cx="5968080" cy="1388880"/>
+            <a:off x="580680" y="2013120"/>
+            <a:ext cx="6579360" cy="1388880"/>
           </a:xfrm>
           <a:prstGeom prst="rect">
             <a:avLst/>
@@ -1089,8 +1089,8 @@
         </p:nvSpPr>
         <p:spPr>
           <a:xfrm>
-            <a:off x="351000" y="1516320"/>
-            <a:ext cx="3083400" cy="1792440"/>
+            <a:off x="387000" y="1516320"/>
+            <a:ext cx="3399120" cy="1792440"/>
           </a:xfrm>
           <a:prstGeom prst="rect">
             <a:avLst/>
@@ -1115,8 +1115,8 @@
         </p:nvSpPr>
         <p:spPr>
           <a:xfrm>
-            <a:off x="3588840" y="1516320"/>
-            <a:ext cx="3083400" cy="1792440"/>
+            <a:off x="3956400" y="1516320"/>
+            <a:ext cx="3399120" cy="1792440"/>
           </a:xfrm>
           <a:prstGeom prst="rect">
             <a:avLst/>
@@ -1141,8 +1141,8 @@
         </p:nvSpPr>
         <p:spPr>
           <a:xfrm>
-            <a:off x="351000" y="3479400"/>
-            <a:ext cx="6318720" cy="1792440"/>
+            <a:off x="387000" y="3479400"/>
+            <a:ext cx="6966000" cy="1792440"/>
           </a:xfrm>
           <a:prstGeom prst="rect">
             <a:avLst/>
@@ -1196,8 +1196,8 @@
         </p:nvSpPr>
         <p:spPr>
           <a:xfrm>
-            <a:off x="526680" y="2013120"/>
-            <a:ext cx="5968080" cy="1388520"/>
+            <a:off x="580680" y="2013120"/>
+            <a:ext cx="6579360" cy="1388520"/>
           </a:xfrm>
           <a:prstGeom prst="rect">
             <a:avLst/>
@@ -1236,8 +1236,8 @@
         </p:nvSpPr>
         <p:spPr>
           <a:xfrm>
-            <a:off x="351000" y="6006240"/>
-            <a:ext cx="1638000" cy="344520"/>
+            <a:off x="387000" y="6006240"/>
+            <a:ext cx="1805760" cy="344520"/>
           </a:xfrm>
           <a:prstGeom prst="rect">
             <a:avLst/>
@@ -1258,7 +1258,7 @@
                 </a:solidFill>
                 <a:latin typeface="Calibri"/>
               </a:rPr>
-              <a:t>4/4/17</a:t>
+              <a:t>4/6/17</a:t>
             </a:r>
             <a:endParaRPr/>
           </a:p>
@@ -1276,8 +1276,8 @@
         </p:nvSpPr>
         <p:spPr>
           <a:xfrm>
-            <a:off x="2399040" y="6006240"/>
-            <a:ext cx="2223000" cy="344520"/>
+            <a:off x="2644560" y="6006240"/>
+            <a:ext cx="2450880" cy="344520"/>
           </a:xfrm>
           <a:prstGeom prst="rect">
             <a:avLst/>
@@ -1302,8 +1302,8 @@
         </p:nvSpPr>
         <p:spPr>
           <a:xfrm>
-            <a:off x="5032080" y="6006240"/>
-            <a:ext cx="1638000" cy="344520"/>
+            <a:off x="5547600" y="6006240"/>
+            <a:ext cx="1805760" cy="344520"/>
           </a:xfrm>
           <a:prstGeom prst="rect">
             <a:avLst/>
@@ -1317,7 +1317,7 @@
                 <a:spcPct val="100000"/>
               </a:lnSpc>
             </a:pPr>
-            <a:fld id="{3635216F-8778-4630-AD5F-7C0739E9044E}" type="slidenum">
+            <a:fld id="{1121A803-F205-448E-ABE9-A27E2D9FBD93}" type="slidenum">
               <a:rPr lang="en-US" sz="1000">
                 <a:solidFill>
                   <a:srgbClr val="8b8b8b"/>
@@ -1342,8 +1342,8 @@
         </p:nvSpPr>
         <p:spPr>
           <a:xfrm>
-            <a:off x="351000" y="1516320"/>
-            <a:ext cx="6318720" cy="3758040"/>
+            <a:off x="387000" y="1516320"/>
+            <a:ext cx="6966000" cy="3758040"/>
           </a:xfrm>
           <a:prstGeom prst="rect">
             <a:avLst/>
@@ -1502,7 +1502,7 @@
         </p:blipFill>
         <p:spPr>
           <a:xfrm>
-            <a:off x="-360" y="-144360"/>
+            <a:off x="-90000" y="-144360"/>
             <a:ext cx="3239640" cy="6548040"/>
           </a:xfrm>
           <a:prstGeom prst="rect">
@@ -1527,8 +1527,8 @@
         </p:blipFill>
         <p:spPr>
           <a:xfrm>
-            <a:off x="3096360" y="1202040"/>
-            <a:ext cx="4355640" cy="3855600"/>
+            <a:off x="2988720" y="790920"/>
+            <a:ext cx="5178240" cy="4677840"/>
           </a:xfrm>
           <a:prstGeom prst="rect">
             <a:avLst/>
@@ -1540,55 +1540,79 @@
       </p:pic>
       <p:sp>
         <p:nvSpPr>
-          <p:cNvPr id="41" name="TextShape 1"/>
-          <p:cNvSpPr txBox="1"/>
+          <p:cNvPr id="41" name="CustomShape 1"/>
+          <p:cNvSpPr/>
           <p:nvPr/>
         </p:nvSpPr>
         <p:spPr>
           <a:xfrm>
-            <a:off x="130320" y="-144360"/>
-            <a:ext cx="548640" cy="430200"/>
-          </a:xfrm>
-          <a:prstGeom prst="rect">
-            <a:avLst/>
-          </a:prstGeom>
-        </p:spPr>
-        <p:txBody>
-          <a:bodyPr lIns="90000" rIns="90000" tIns="45000" bIns="45000"/>
-          <a:p>
+            <a:off x="3584880" y="1008000"/>
+            <a:ext cx="537840" cy="456120"/>
+          </a:xfrm>
+          <a:prstGeom prst="rect">
+            <a:avLst/>
+          </a:prstGeom>
+          <a:noFill/>
+          <a:ln>
+            <a:noFill/>
+          </a:ln>
+        </p:spPr>
+        <p:txBody>
+          <a:bodyPr wrap="none" lIns="90000" rIns="90000" tIns="45000" bIns="45000"/>
+          <a:p>
+            <a:pPr>
+              <a:lnSpc>
+                <a:spcPct val="100000"/>
+              </a:lnSpc>
+            </a:pPr>
             <a:r>
               <a:rPr lang="en-US" sz="2400">
-                <a:latin typeface="Times new roman"/>
+                <a:solidFill>
+                  <a:srgbClr val="000000"/>
+                </a:solidFill>
+                <a:latin typeface="Times New Roman"/>
+              </a:rPr>
+              <a:t>(b)</a:t>
+            </a:r>
+            <a:endParaRPr/>
+          </a:p>
+        </p:txBody>
+      </p:sp>
+      <p:sp>
+        <p:nvSpPr>
+          <p:cNvPr id="42" name="CustomShape 2"/>
+          <p:cNvSpPr/>
+          <p:nvPr/>
+        </p:nvSpPr>
+        <p:spPr>
+          <a:xfrm>
+            <a:off x="824760" y="119880"/>
+            <a:ext cx="520920" cy="456120"/>
+          </a:xfrm>
+          <a:prstGeom prst="rect">
+            <a:avLst/>
+          </a:prstGeom>
+          <a:noFill/>
+          <a:ln>
+            <a:noFill/>
+          </a:ln>
+        </p:spPr>
+        <p:txBody>
+          <a:bodyPr wrap="none" lIns="90000" rIns="90000" tIns="45000" bIns="45000"/>
+          <a:p>
+            <a:pPr>
+              <a:lnSpc>
+                <a:spcPct val="100000"/>
+              </a:lnSpc>
+            </a:pPr>
+            <a:r>
+              <a:rPr lang="en-US" sz="2400">
+                <a:solidFill>
+                  <a:srgbClr val="ffffff"/>
+                </a:solidFill>
+                <a:latin typeface="Times New Roman"/>
               </a:rPr>
               <a:t>(a)</a:t>
-            </a:r>
-            <a:endParaRPr/>
-          </a:p>
-        </p:txBody>
-      </p:sp>
-      <p:sp>
-        <p:nvSpPr>
-          <p:cNvPr id="42" name="TextShape 2"/>
-          <p:cNvSpPr txBox="1"/>
-          <p:nvPr/>
-        </p:nvSpPr>
-        <p:spPr>
-          <a:xfrm>
-            <a:off x="3118320" y="1116000"/>
-            <a:ext cx="548640" cy="430200"/>
-          </a:xfrm>
-          <a:prstGeom prst="rect">
-            <a:avLst/>
-          </a:prstGeom>
-        </p:spPr>
-        <p:txBody>
-          <a:bodyPr lIns="90000" rIns="90000" tIns="45000" bIns="45000"/>
-          <a:p>
-            <a:r>
-              <a:rPr lang="en-US" sz="2400">
-                <a:latin typeface="Times new roman"/>
-              </a:rPr>
-              <a:t>(b)</a:t>
             </a:r>
             <a:endParaRPr/>
           </a:p>

</xml_diff>